<commit_message>
git 및 github 첫걸음
</commit_message>
<xml_diff>
--- a/git및github첫걸음.pptx
+++ b/git및github첫걸음.pptx
@@ -5,7 +5,7 @@
     <p:sldMasterId id="2147483660" r:id="rId1"/>
   </p:sldMasterIdLst>
   <p:notesMasterIdLst>
-    <p:notesMasterId r:id="rId31"/>
+    <p:notesMasterId r:id="rId33"/>
   </p:notesMasterIdLst>
   <p:sldIdLst>
     <p:sldId id="256" r:id="rId2"/>
@@ -36,7 +36,9 @@
     <p:sldId id="288" r:id="rId27"/>
     <p:sldId id="289" r:id="rId28"/>
     <p:sldId id="290" r:id="rId29"/>
-    <p:sldId id="259" r:id="rId30"/>
+    <p:sldId id="291" r:id="rId30"/>
+    <p:sldId id="292" r:id="rId31"/>
+    <p:sldId id="259" r:id="rId32"/>
   </p:sldIdLst>
   <p:sldSz cx="9144000" cy="6858000" type="screen4x3"/>
   <p:notesSz cx="6858000" cy="9144000"/>
@@ -2149,15 +2151,7 @@
             </a:r>
             <a:r>
               <a:rPr lang="ko-KR" altLang="en-US" baseline="0" dirty="0" smtClean="0"/>
-              <a:t>먼저 확인 </a:t>
-            </a:r>
-            <a:r>
-              <a:rPr lang="ko-KR" altLang="en-US" baseline="0" smtClean="0"/>
-              <a:t>검토과정을 거치게 되므로 </a:t>
-            </a:r>
-            <a:r>
-              <a:rPr lang="ko-KR" altLang="en-US" baseline="0" dirty="0" smtClean="0"/>
-              <a:t>신중하게 할 </a:t>
+              <a:t>먼저 확인 검토과정을 거치게 되므로 신중하게 할 </a:t>
             </a:r>
             <a:r>
               <a:rPr lang="ko-KR" altLang="en-US" baseline="0" dirty="0" err="1" smtClean="0"/>
@@ -2198,6 +2192,174 @@
     <p:extLst>
       <p:ext uri="{BB962C8B-B14F-4D97-AF65-F5344CB8AC3E}">
         <p14:creationId xmlns:p14="http://schemas.microsoft.com/office/powerpoint/2010/main" val="1354663592"/>
+      </p:ext>
+    </p:extLst>
+  </p:cSld>
+  <p:clrMapOvr>
+    <a:masterClrMapping/>
+  </p:clrMapOvr>
+</p:notes>
+</file>
+
+<file path=ppt/notesSlides/notesSlide24.xml><?xml version="1.0" encoding="utf-8"?>
+<p:notes xmlns:a="http://schemas.openxmlformats.org/drawingml/2006/main" xmlns:r="http://schemas.openxmlformats.org/officeDocument/2006/relationships" xmlns:p="http://schemas.openxmlformats.org/presentationml/2006/main">
+  <p:cSld>
+    <p:spTree>
+      <p:nvGrpSpPr>
+        <p:cNvPr id="1" name=""/>
+        <p:cNvGrpSpPr/>
+        <p:nvPr/>
+      </p:nvGrpSpPr>
+      <p:grpSpPr>
+        <a:xfrm>
+          <a:off x="0" y="0"/>
+          <a:ext cx="0" cy="0"/>
+          <a:chOff x="0" y="0"/>
+          <a:chExt cx="0" cy="0"/>
+        </a:xfrm>
+      </p:grpSpPr>
+      <p:sp>
+        <p:nvSpPr>
+          <p:cNvPr id="2" name="슬라이드 이미지 개체 틀 1"/>
+          <p:cNvSpPr>
+            <a:spLocks noGrp="1" noRot="1" noChangeAspect="1"/>
+          </p:cNvSpPr>
+          <p:nvPr>
+            <p:ph type="sldImg"/>
+          </p:nvPr>
+        </p:nvSpPr>
+        <p:spPr/>
+      </p:sp>
+      <p:sp>
+        <p:nvSpPr>
+          <p:cNvPr id="3" name="슬라이드 노트 개체 틀 2"/>
+          <p:cNvSpPr>
+            <a:spLocks noGrp="1"/>
+          </p:cNvSpPr>
+          <p:nvPr>
+            <p:ph type="body" idx="1"/>
+          </p:nvPr>
+        </p:nvSpPr>
+        <p:spPr/>
+        <p:txBody>
+          <a:bodyPr/>
+          <a:lstStyle/>
+          <a:p>
+            <a:endParaRPr lang="ko-KR" altLang="en-US" dirty="0"/>
+          </a:p>
+        </p:txBody>
+      </p:sp>
+      <p:sp>
+        <p:nvSpPr>
+          <p:cNvPr id="4" name="슬라이드 번호 개체 틀 3"/>
+          <p:cNvSpPr>
+            <a:spLocks noGrp="1"/>
+          </p:cNvSpPr>
+          <p:nvPr>
+            <p:ph type="sldNum" sz="quarter" idx="10"/>
+          </p:nvPr>
+        </p:nvSpPr>
+        <p:spPr/>
+        <p:txBody>
+          <a:bodyPr/>
+          <a:lstStyle/>
+          <a:p>
+            <a:fld id="{625D4AC4-540A-4436-887D-BF6A8FCF1275}" type="slidenum">
+              <a:rPr lang="ko-KR" altLang="en-US" smtClean="0"/>
+              <a:t>29</a:t>
+            </a:fld>
+            <a:endParaRPr lang="ko-KR" altLang="en-US"/>
+          </a:p>
+        </p:txBody>
+      </p:sp>
+    </p:spTree>
+    <p:extLst>
+      <p:ext uri="{BB962C8B-B14F-4D97-AF65-F5344CB8AC3E}">
+        <p14:creationId xmlns:p14="http://schemas.microsoft.com/office/powerpoint/2010/main" val="2656794270"/>
+      </p:ext>
+    </p:extLst>
+  </p:cSld>
+  <p:clrMapOvr>
+    <a:masterClrMapping/>
+  </p:clrMapOvr>
+</p:notes>
+</file>
+
+<file path=ppt/notesSlides/notesSlide25.xml><?xml version="1.0" encoding="utf-8"?>
+<p:notes xmlns:a="http://schemas.openxmlformats.org/drawingml/2006/main" xmlns:r="http://schemas.openxmlformats.org/officeDocument/2006/relationships" xmlns:p="http://schemas.openxmlformats.org/presentationml/2006/main">
+  <p:cSld>
+    <p:spTree>
+      <p:nvGrpSpPr>
+        <p:cNvPr id="1" name=""/>
+        <p:cNvGrpSpPr/>
+        <p:nvPr/>
+      </p:nvGrpSpPr>
+      <p:grpSpPr>
+        <a:xfrm>
+          <a:off x="0" y="0"/>
+          <a:ext cx="0" cy="0"/>
+          <a:chOff x="0" y="0"/>
+          <a:chExt cx="0" cy="0"/>
+        </a:xfrm>
+      </p:grpSpPr>
+      <p:sp>
+        <p:nvSpPr>
+          <p:cNvPr id="2" name="슬라이드 이미지 개체 틀 1"/>
+          <p:cNvSpPr>
+            <a:spLocks noGrp="1" noRot="1" noChangeAspect="1"/>
+          </p:cNvSpPr>
+          <p:nvPr>
+            <p:ph type="sldImg"/>
+          </p:nvPr>
+        </p:nvSpPr>
+        <p:spPr/>
+      </p:sp>
+      <p:sp>
+        <p:nvSpPr>
+          <p:cNvPr id="3" name="슬라이드 노트 개체 틀 2"/>
+          <p:cNvSpPr>
+            <a:spLocks noGrp="1"/>
+          </p:cNvSpPr>
+          <p:nvPr>
+            <p:ph type="body" idx="1"/>
+          </p:nvPr>
+        </p:nvSpPr>
+        <p:spPr/>
+        <p:txBody>
+          <a:bodyPr/>
+          <a:lstStyle/>
+          <a:p>
+            <a:endParaRPr lang="ko-KR" altLang="en-US" dirty="0"/>
+          </a:p>
+        </p:txBody>
+      </p:sp>
+      <p:sp>
+        <p:nvSpPr>
+          <p:cNvPr id="4" name="슬라이드 번호 개체 틀 3"/>
+          <p:cNvSpPr>
+            <a:spLocks noGrp="1"/>
+          </p:cNvSpPr>
+          <p:nvPr>
+            <p:ph type="sldNum" sz="quarter" idx="10"/>
+          </p:nvPr>
+        </p:nvSpPr>
+        <p:spPr/>
+        <p:txBody>
+          <a:bodyPr/>
+          <a:lstStyle/>
+          <a:p>
+            <a:fld id="{625D4AC4-540A-4436-887D-BF6A8FCF1275}" type="slidenum">
+              <a:rPr lang="ko-KR" altLang="en-US" smtClean="0"/>
+              <a:t>30</a:t>
+            </a:fld>
+            <a:endParaRPr lang="ko-KR" altLang="en-US"/>
+          </a:p>
+        </p:txBody>
+      </p:sp>
+    </p:spTree>
+    <p:extLst>
+      <p:ext uri="{BB962C8B-B14F-4D97-AF65-F5344CB8AC3E}">
+        <p14:creationId xmlns:p14="http://schemas.microsoft.com/office/powerpoint/2010/main" val="2930983645"/>
       </p:ext>
     </p:extLst>
   </p:cSld>
@@ -14317,8 +14479,8 @@
           <a:lstStyle/>
           <a:p>
             <a:r>
-              <a:rPr lang="ko-KR" altLang="en-US" dirty="0" smtClean="0"/>
-              <a:t>협업시작하기</a:t>
+              <a:rPr lang="en-US" altLang="ko-KR" dirty="0" smtClean="0"/>
+              <a:t>Pull Request</a:t>
             </a:r>
             <a:endParaRPr lang="ko-KR" altLang="en-US" dirty="0"/>
           </a:p>
@@ -14326,249 +14488,10 @@
       </p:sp>
       <p:sp>
         <p:nvSpPr>
-          <p:cNvPr id="5" name="내용 개체 틀 4">
+          <p:cNvPr id="7" name="내용 개체 틀 2">
             <a:extLst>
               <a:ext uri="{FF2B5EF4-FFF2-40B4-BE49-F238E27FC236}">
-                <a16:creationId xmlns:a16="http://schemas.microsoft.com/office/drawing/2014/main" id="{FDF69C25-9F43-470B-8A20-AEDC0F371CCD}"/>
-              </a:ext>
-            </a:extLst>
-          </p:cNvPr>
-          <p:cNvSpPr>
-            <a:spLocks noGrp="1"/>
-          </p:cNvSpPr>
-          <p:nvPr>
-            <p:ph idx="1"/>
-          </p:nvPr>
-        </p:nvSpPr>
-        <p:spPr>
-          <a:xfrm>
-            <a:off x="250825" y="1000221"/>
-            <a:ext cx="8641655" cy="2996743"/>
-          </a:xfrm>
-        </p:spPr>
-        <p:txBody>
-          <a:bodyPr tIns="0" bIns="0">
-            <a:noAutofit/>
-          </a:bodyPr>
-          <a:lstStyle/>
-          <a:p>
-            <a:pPr>
-              <a:buClr>
-                <a:schemeClr val="tx1">
-                  <a:lumMod val="65000"/>
-                  <a:lumOff val="35000"/>
-                </a:schemeClr>
-              </a:buClr>
-              <a:defRPr/>
-            </a:pPr>
-            <a:r>
-              <a:rPr lang="ko-KR" altLang="en-US" dirty="0"/>
-              <a:t>프로젝트 만들기</a:t>
-            </a:r>
-          </a:p>
-          <a:p>
-            <a:pPr marL="609600" lvl="1" indent="-342900">
-              <a:buClr>
-                <a:schemeClr val="tx1">
-                  <a:lumMod val="65000"/>
-                  <a:lumOff val="35000"/>
-                </a:schemeClr>
-              </a:buClr>
-              <a:buFont typeface="+mj-ea"/>
-              <a:buAutoNum type="circleNumDbPlain"/>
-              <a:defRPr/>
-            </a:pPr>
-            <a:r>
-              <a:rPr lang="en-US" altLang="ko-KR" dirty="0" err="1" smtClean="0"/>
-              <a:t>Github</a:t>
-            </a:r>
-            <a:r>
-              <a:rPr lang="en-US" altLang="ko-KR" dirty="0" smtClean="0"/>
-              <a:t> </a:t>
-            </a:r>
-            <a:r>
-              <a:rPr lang="ko-KR" altLang="en-US" dirty="0" smtClean="0"/>
-              <a:t>등록</a:t>
-            </a:r>
-            <a:endParaRPr lang="en-US" altLang="ko-KR" dirty="0"/>
-          </a:p>
-          <a:p>
-            <a:pPr marL="609600" lvl="1" indent="-342900">
-              <a:buClr>
-                <a:schemeClr val="tx1">
-                  <a:lumMod val="65000"/>
-                  <a:lumOff val="35000"/>
-                </a:schemeClr>
-              </a:buClr>
-              <a:buFont typeface="+mj-ea"/>
-              <a:buAutoNum type="circleNumDbPlain"/>
-              <a:defRPr/>
-            </a:pPr>
-            <a:r>
-              <a:rPr lang="en-US" altLang="ko-KR" dirty="0" smtClean="0"/>
-              <a:t>P</a:t>
-            </a:r>
-            <a:endParaRPr lang="en-US" altLang="ko-KR" dirty="0"/>
-          </a:p>
-          <a:p>
-            <a:pPr marL="609600" lvl="1" indent="-342900">
-              <a:buClr>
-                <a:schemeClr val="tx1">
-                  <a:lumMod val="65000"/>
-                  <a:lumOff val="35000"/>
-                </a:schemeClr>
-              </a:buClr>
-              <a:buFont typeface="+mj-ea"/>
-              <a:buAutoNum type="circleNumDbPlain"/>
-              <a:defRPr/>
-            </a:pPr>
-            <a:r>
-              <a:rPr lang="en-US" altLang="ko-KR" dirty="0"/>
-              <a:t> </a:t>
-            </a:r>
-            <a:endParaRPr lang="en-US" altLang="ko-KR" dirty="0"/>
-          </a:p>
-          <a:p>
-            <a:pPr marL="609600" lvl="1" indent="-342900">
-              <a:buClr>
-                <a:schemeClr val="tx1">
-                  <a:lumMod val="65000"/>
-                  <a:lumOff val="35000"/>
-                </a:schemeClr>
-              </a:buClr>
-              <a:buFont typeface="+mj-ea"/>
-              <a:buAutoNum type="circleNumDbPlain"/>
-              <a:defRPr/>
-            </a:pPr>
-            <a:r>
-              <a:rPr lang="en-US" altLang="ko-KR" dirty="0"/>
-              <a:t> </a:t>
-            </a:r>
-            <a:endParaRPr lang="en-US" altLang="ko-KR" dirty="0"/>
-          </a:p>
-          <a:p>
-            <a:pPr marL="609600" lvl="1" indent="-342900">
-              <a:buClr>
-                <a:schemeClr val="tx1">
-                  <a:lumMod val="65000"/>
-                  <a:lumOff val="35000"/>
-                </a:schemeClr>
-              </a:buClr>
-              <a:buFont typeface="+mj-ea"/>
-              <a:buAutoNum type="circleNumDbPlain"/>
-              <a:defRPr/>
-            </a:pPr>
-            <a:r>
-              <a:rPr lang="en-US" altLang="ko-KR" dirty="0"/>
-              <a:t> </a:t>
-            </a:r>
-            <a:endParaRPr lang="en-US" altLang="ko-KR" dirty="0" smtClean="0"/>
-          </a:p>
-          <a:p>
-            <a:pPr marL="609600" lvl="1" indent="-342900">
-              <a:buClr>
-                <a:schemeClr val="tx1">
-                  <a:lumMod val="65000"/>
-                  <a:lumOff val="35000"/>
-                </a:schemeClr>
-              </a:buClr>
-              <a:buFont typeface="+mj-ea"/>
-              <a:buAutoNum type="circleNumDbPlain"/>
-              <a:defRPr/>
-            </a:pPr>
-            <a:r>
-              <a:rPr lang="en-US" altLang="ko-KR" dirty="0" smtClean="0">
-                <a:solidFill>
-                  <a:srgbClr val="FF0000"/>
-                </a:solidFill>
-              </a:rPr>
-              <a:t>Clone</a:t>
-            </a:r>
-            <a:r>
-              <a:rPr lang="ko-KR" altLang="en-US" dirty="0" smtClean="0">
-                <a:solidFill>
-                  <a:srgbClr val="FF0000"/>
-                </a:solidFill>
-              </a:rPr>
-              <a:t>과 </a:t>
-            </a:r>
-            <a:r>
-              <a:rPr lang="en-US" altLang="ko-KR" dirty="0" smtClean="0">
-                <a:solidFill>
-                  <a:srgbClr val="FF0000"/>
-                </a:solidFill>
-              </a:rPr>
-              <a:t>pull</a:t>
-            </a:r>
-            <a:r>
-              <a:rPr lang="ko-KR" altLang="en-US" dirty="0" smtClean="0">
-                <a:solidFill>
-                  <a:srgbClr val="FF0000"/>
-                </a:solidFill>
-              </a:rPr>
-              <a:t>이</a:t>
-            </a:r>
-            <a:r>
-              <a:rPr lang="en-US" altLang="ko-KR" dirty="0" smtClean="0">
-                <a:solidFill>
-                  <a:srgbClr val="FF0000"/>
-                </a:solidFill>
-              </a:rPr>
-              <a:t> </a:t>
-            </a:r>
-            <a:r>
-              <a:rPr lang="ko-KR" altLang="en-US" dirty="0" smtClean="0">
-                <a:solidFill>
-                  <a:srgbClr val="FF0000"/>
-                </a:solidFill>
-              </a:rPr>
-              <a:t>차이</a:t>
-            </a:r>
-            <a:r>
-              <a:rPr lang="en-US" altLang="ko-KR" dirty="0" smtClean="0">
-                <a:solidFill>
-                  <a:srgbClr val="FF0000"/>
-                </a:solidFill>
-              </a:rPr>
-              <a:t>, </a:t>
-            </a:r>
-            <a:r>
-              <a:rPr lang="ko-KR" altLang="en-US" dirty="0" smtClean="0">
-                <a:solidFill>
-                  <a:srgbClr val="FF0000"/>
-                </a:solidFill>
-              </a:rPr>
-              <a:t>로컬에서 자동 </a:t>
-            </a:r>
-            <a:r>
-              <a:rPr lang="ko-KR" altLang="en-US" dirty="0" smtClean="0">
-                <a:solidFill>
-                  <a:srgbClr val="FF0000"/>
-                </a:solidFill>
-              </a:rPr>
-              <a:t>연결 삭제 방법 확인</a:t>
-            </a:r>
-            <a:endParaRPr lang="en-US" altLang="ko-KR" dirty="0">
-              <a:solidFill>
-                <a:srgbClr val="FF0000"/>
-              </a:solidFill>
-            </a:endParaRPr>
-          </a:p>
-          <a:p>
-            <a:endParaRPr lang="ko-KR" altLang="en-US" dirty="0">
-              <a:solidFill>
-                <a:srgbClr val="FF0000"/>
-              </a:solidFill>
-            </a:endParaRPr>
-          </a:p>
-        </p:txBody>
-      </p:sp>
-      <p:sp>
-        <p:nvSpPr>
-          <p:cNvPr id="6" name="내용 개체 틀 4">
-            <a:extLst>
-              <a:ext uri="{FF2B5EF4-FFF2-40B4-BE49-F238E27FC236}">
-                <a16:creationId xmlns:a16="http://schemas.microsoft.com/office/drawing/2014/main" id="{59FE1F7F-BB82-4587-A86F-471C542D6EA7}"/>
+                <a16:creationId xmlns:a16="http://schemas.microsoft.com/office/drawing/2014/main" id="{A44AC902-3746-40D6-9827-94B46EEDDC67}"/>
               </a:ext>
             </a:extLst>
           </p:cNvPr>
@@ -14579,208 +14502,22 @@
         </p:nvSpPr>
         <p:spPr>
           <a:xfrm>
-            <a:off x="250825" y="4506993"/>
-            <a:ext cx="8641655" cy="1526162"/>
+            <a:off x="341787" y="1120544"/>
+            <a:ext cx="8642350" cy="4779215"/>
           </a:xfrm>
           <a:prstGeom prst="rect">
             <a:avLst/>
           </a:prstGeom>
         </p:spPr>
         <p:txBody>
-          <a:bodyPr vert="horz" lIns="91440" tIns="0" rIns="91440" bIns="0" rtlCol="0">
+          <a:bodyPr vert="horz" lIns="91440" tIns="45720" rIns="91440" bIns="45720" rtlCol="0">
             <a:noAutofit/>
           </a:bodyPr>
           <a:lstStyle>
-            <a:lvl1pPr marL="266700" indent="-266700" algn="l" defTabSz="914400" rtl="0" eaLnBrk="1" latinLnBrk="1" hangingPunct="1">
+            <a:lvl1pPr marL="266700" indent="-266700" defTabSz="914400" latinLnBrk="1">
               <a:lnSpc>
                 <a:spcPct val="150000"/>
               </a:lnSpc>
-              <a:spcBef>
-                <a:spcPts val="0"/>
-              </a:spcBef>
-              <a:buClr>
-                <a:schemeClr val="accent4"/>
-              </a:buClr>
-              <a:buFont typeface="Wingdings" pitchFamily="2" charset="2"/>
-              <a:buChar char="n"/>
-              <a:defRPr sz="2000" b="1" kern="1200">
-                <a:solidFill>
-                  <a:schemeClr val="tx1"/>
-                </a:solidFill>
-                <a:latin typeface="+mn-ea"/>
-                <a:ea typeface="+mn-ea"/>
-                <a:cs typeface="+mn-cs"/>
-              </a:defRPr>
-            </a:lvl1pPr>
-            <a:lvl2pPr marL="447675" indent="-180975" algn="l" defTabSz="914400" rtl="0" eaLnBrk="1" latinLnBrk="1" hangingPunct="1">
-              <a:lnSpc>
-                <a:spcPct val="150000"/>
-              </a:lnSpc>
-              <a:spcBef>
-                <a:spcPts val="500"/>
-              </a:spcBef>
-              <a:spcAft>
-                <a:spcPts val="400"/>
-              </a:spcAft>
-              <a:buClr>
-                <a:schemeClr val="accent4"/>
-              </a:buClr>
-              <a:buFont typeface="Wingdings" pitchFamily="2" charset="2"/>
-              <a:buChar char="§"/>
-              <a:defRPr sz="1600" kern="1200">
-                <a:solidFill>
-                  <a:schemeClr val="tx1"/>
-                </a:solidFill>
-                <a:latin typeface="+mn-lt"/>
-                <a:ea typeface="+mn-ea"/>
-                <a:cs typeface="+mn-cs"/>
-              </a:defRPr>
-            </a:lvl2pPr>
-            <a:lvl3pPr marL="628650" indent="-180975" algn="l" defTabSz="914400" rtl="0" eaLnBrk="1" latinLnBrk="1" hangingPunct="1">
-              <a:lnSpc>
-                <a:spcPct val="150000"/>
-              </a:lnSpc>
-              <a:spcBef>
-                <a:spcPts val="500"/>
-              </a:spcBef>
-              <a:spcAft>
-                <a:spcPts val="300"/>
-              </a:spcAft>
-              <a:buClr>
-                <a:schemeClr val="accent4"/>
-              </a:buClr>
-              <a:buFont typeface="Arial" panose="020B0604020202020204" pitchFamily="34" charset="0"/>
-              <a:buChar char="•"/>
-              <a:defRPr sz="1400" kern="1200">
-                <a:solidFill>
-                  <a:schemeClr val="tx1"/>
-                </a:solidFill>
-                <a:latin typeface="+mn-lt"/>
-                <a:ea typeface="+mn-ea"/>
-                <a:cs typeface="+mn-cs"/>
-              </a:defRPr>
-            </a:lvl3pPr>
-            <a:lvl4pPr marL="809625" indent="-180975" algn="l" defTabSz="914400" rtl="0" eaLnBrk="1" latinLnBrk="1" hangingPunct="1">
-              <a:lnSpc>
-                <a:spcPct val="150000"/>
-              </a:lnSpc>
-              <a:spcBef>
-                <a:spcPts val="500"/>
-              </a:spcBef>
-              <a:spcAft>
-                <a:spcPts val="300"/>
-              </a:spcAft>
-              <a:buClr>
-                <a:schemeClr val="accent4"/>
-              </a:buClr>
-              <a:buSzPct val="96000"/>
-              <a:buFont typeface="Arial" panose="020B0604020202020204" pitchFamily="34" charset="0"/>
-              <a:buChar char="•"/>
-              <a:defRPr sz="1200" kern="1200">
-                <a:solidFill>
-                  <a:schemeClr val="tx1"/>
-                </a:solidFill>
-                <a:latin typeface="+mn-lt"/>
-                <a:ea typeface="+mn-ea"/>
-                <a:cs typeface="+mn-cs"/>
-              </a:defRPr>
-            </a:lvl4pPr>
-            <a:lvl5pPr marL="990600" indent="-180975" algn="l" defTabSz="914400" rtl="0" eaLnBrk="1" latinLnBrk="1" hangingPunct="1">
-              <a:lnSpc>
-                <a:spcPct val="150000"/>
-              </a:lnSpc>
-              <a:spcBef>
-                <a:spcPts val="500"/>
-              </a:spcBef>
-              <a:buClr>
-                <a:schemeClr val="accent4"/>
-              </a:buClr>
-              <a:buFont typeface="Arial" panose="020B0604020202020204" pitchFamily="34" charset="0"/>
-              <a:buChar char="•"/>
-              <a:defRPr sz="1000" kern="1200">
-                <a:solidFill>
-                  <a:schemeClr val="tx1"/>
-                </a:solidFill>
-                <a:latin typeface="+mn-lt"/>
-                <a:ea typeface="+mn-ea"/>
-                <a:cs typeface="+mn-cs"/>
-              </a:defRPr>
-            </a:lvl5pPr>
-            <a:lvl6pPr marL="2514600" indent="-228600" algn="l" defTabSz="914400" rtl="0" eaLnBrk="1" latinLnBrk="1" hangingPunct="1">
-              <a:lnSpc>
-                <a:spcPct val="90000"/>
-              </a:lnSpc>
-              <a:spcBef>
-                <a:spcPts val="500"/>
-              </a:spcBef>
-              <a:buFont typeface="Arial" panose="020B0604020202020204" pitchFamily="34" charset="0"/>
-              <a:buChar char="•"/>
-              <a:defRPr sz="1800" kern="1200">
-                <a:solidFill>
-                  <a:schemeClr val="tx1"/>
-                </a:solidFill>
-                <a:latin typeface="+mn-lt"/>
-                <a:ea typeface="+mn-ea"/>
-                <a:cs typeface="+mn-cs"/>
-              </a:defRPr>
-            </a:lvl6pPr>
-            <a:lvl7pPr marL="2971800" indent="-228600" algn="l" defTabSz="914400" rtl="0" eaLnBrk="1" latinLnBrk="1" hangingPunct="1">
-              <a:lnSpc>
-                <a:spcPct val="90000"/>
-              </a:lnSpc>
-              <a:spcBef>
-                <a:spcPts val="500"/>
-              </a:spcBef>
-              <a:buFont typeface="Arial" panose="020B0604020202020204" pitchFamily="34" charset="0"/>
-              <a:buChar char="•"/>
-              <a:defRPr sz="1800" kern="1200">
-                <a:solidFill>
-                  <a:schemeClr val="tx1"/>
-                </a:solidFill>
-                <a:latin typeface="+mn-lt"/>
-                <a:ea typeface="+mn-ea"/>
-                <a:cs typeface="+mn-cs"/>
-              </a:defRPr>
-            </a:lvl7pPr>
-            <a:lvl8pPr marL="3429000" indent="-228600" algn="l" defTabSz="914400" rtl="0" eaLnBrk="1" latinLnBrk="1" hangingPunct="1">
-              <a:lnSpc>
-                <a:spcPct val="90000"/>
-              </a:lnSpc>
-              <a:spcBef>
-                <a:spcPts val="500"/>
-              </a:spcBef>
-              <a:buFont typeface="Arial" panose="020B0604020202020204" pitchFamily="34" charset="0"/>
-              <a:buChar char="•"/>
-              <a:defRPr sz="1800" kern="1200">
-                <a:solidFill>
-                  <a:schemeClr val="tx1"/>
-                </a:solidFill>
-                <a:latin typeface="+mn-lt"/>
-                <a:ea typeface="+mn-ea"/>
-                <a:cs typeface="+mn-cs"/>
-              </a:defRPr>
-            </a:lvl8pPr>
-            <a:lvl9pPr marL="3886200" indent="-228600" algn="l" defTabSz="914400" rtl="0" eaLnBrk="1" latinLnBrk="1" hangingPunct="1">
-              <a:lnSpc>
-                <a:spcPct val="90000"/>
-              </a:lnSpc>
-              <a:spcBef>
-                <a:spcPts val="500"/>
-              </a:spcBef>
-              <a:buFont typeface="Arial" panose="020B0604020202020204" pitchFamily="34" charset="0"/>
-              <a:buChar char="•"/>
-              <a:defRPr sz="1800" kern="1200">
-                <a:solidFill>
-                  <a:schemeClr val="tx1"/>
-                </a:solidFill>
-                <a:latin typeface="+mn-lt"/>
-                <a:ea typeface="+mn-ea"/>
-                <a:cs typeface="+mn-cs"/>
-              </a:defRPr>
-            </a:lvl9pPr>
-          </a:lstStyle>
-          <a:p>
-            <a:pPr marL="457200" indent="-457200">
               <a:spcBef>
                 <a:spcPct val="0"/>
               </a:spcBef>
@@ -14790,74 +14527,385 @@
                   <a:lumOff val="35000"/>
                 </a:schemeClr>
               </a:buClr>
-              <a:buFont typeface="+mj-lt"/>
-              <a:buAutoNum type="arabicPeriod"/>
-            </a:pPr>
-            <a:r>
-              <a:rPr lang="ko-KR" altLang="en-US" dirty="0"/>
-              <a:t>프로젝트 만들기</a:t>
-            </a:r>
-            <a:endParaRPr lang="en-US" altLang="ko-KR" dirty="0"/>
-          </a:p>
-          <a:p>
-            <a:pPr marL="609600" lvl="1" indent="-342900">
+              <a:buFont typeface="Wingdings" pitchFamily="2" charset="2"/>
+              <a:buChar char="n"/>
+              <a:defRPr sz="2000" b="1">
+                <a:latin typeface="+mn-ea"/>
+              </a:defRPr>
+            </a:lvl1pPr>
+            <a:lvl2pPr marL="447675" lvl="1" indent="-180975" defTabSz="914400" latinLnBrk="1">
+              <a:lnSpc>
+                <a:spcPct val="150000"/>
+              </a:lnSpc>
+              <a:spcBef>
+                <a:spcPts val="0"/>
+              </a:spcBef>
+              <a:spcAft>
+                <a:spcPts val="0"/>
+              </a:spcAft>
               <a:buClr>
                 <a:schemeClr val="tx1">
                   <a:lumMod val="50000"/>
                   <a:lumOff val="50000"/>
                 </a:schemeClr>
               </a:buClr>
-              <a:buFont typeface="+mj-lt"/>
-              <a:buAutoNum type="arabicPeriod"/>
+              <a:buFont typeface="Wingdings" pitchFamily="2" charset="2"/>
+              <a:buChar char="§"/>
+              <a:defRPr sz="1600"/>
+            </a:lvl2pPr>
+            <a:lvl3pPr marL="628650" indent="-180975" defTabSz="914400" latinLnBrk="1">
+              <a:lnSpc>
+                <a:spcPct val="150000"/>
+              </a:lnSpc>
+              <a:spcBef>
+                <a:spcPts val="500"/>
+              </a:spcBef>
+              <a:spcAft>
+                <a:spcPts val="300"/>
+              </a:spcAft>
+              <a:buClr>
+                <a:schemeClr val="tx1">
+                  <a:lumMod val="65000"/>
+                  <a:lumOff val="35000"/>
+                </a:schemeClr>
+              </a:buClr>
+              <a:buFont typeface="Arial" panose="020B0604020202020204" pitchFamily="34" charset="0"/>
+              <a:buChar char="•"/>
+              <a:defRPr sz="1400"/>
+            </a:lvl3pPr>
+            <a:lvl4pPr marL="809625" indent="-180975" defTabSz="914400" latinLnBrk="1">
+              <a:lnSpc>
+                <a:spcPct val="150000"/>
+              </a:lnSpc>
+              <a:spcBef>
+                <a:spcPts val="500"/>
+              </a:spcBef>
+              <a:spcAft>
+                <a:spcPts val="300"/>
+              </a:spcAft>
+              <a:buClr>
+                <a:schemeClr val="tx1">
+                  <a:lumMod val="65000"/>
+                  <a:lumOff val="35000"/>
+                </a:schemeClr>
+              </a:buClr>
+              <a:buSzPct val="96000"/>
+              <a:buFont typeface="Arial" panose="020B0604020202020204" pitchFamily="34" charset="0"/>
+              <a:buChar char="•"/>
+              <a:defRPr sz="1200"/>
+            </a:lvl4pPr>
+            <a:lvl5pPr marL="990600" indent="-180975" defTabSz="914400" latinLnBrk="1">
+              <a:lnSpc>
+                <a:spcPct val="150000"/>
+              </a:lnSpc>
+              <a:spcBef>
+                <a:spcPts val="500"/>
+              </a:spcBef>
+              <a:buClr>
+                <a:schemeClr val="tx1">
+                  <a:lumMod val="65000"/>
+                  <a:lumOff val="35000"/>
+                </a:schemeClr>
+              </a:buClr>
+              <a:buFont typeface="Arial" panose="020B0604020202020204" pitchFamily="34" charset="0"/>
+              <a:buChar char="•"/>
+              <a:defRPr sz="1000"/>
+            </a:lvl5pPr>
+            <a:lvl6pPr marL="2514600" indent="-228600" defTabSz="914400" latinLnBrk="1">
+              <a:lnSpc>
+                <a:spcPct val="90000"/>
+              </a:lnSpc>
+              <a:spcBef>
+                <a:spcPts val="500"/>
+              </a:spcBef>
+              <a:buFont typeface="Arial" panose="020B0604020202020204" pitchFamily="34" charset="0"/>
+              <a:buChar char="•"/>
+            </a:lvl6pPr>
+            <a:lvl7pPr marL="2971800" indent="-228600" defTabSz="914400" latinLnBrk="1">
+              <a:lnSpc>
+                <a:spcPct val="90000"/>
+              </a:lnSpc>
+              <a:spcBef>
+                <a:spcPts val="500"/>
+              </a:spcBef>
+              <a:buFont typeface="Arial" panose="020B0604020202020204" pitchFamily="34" charset="0"/>
+              <a:buChar char="•"/>
+            </a:lvl7pPr>
+            <a:lvl8pPr marL="3429000" indent="-228600" defTabSz="914400" latinLnBrk="1">
+              <a:lnSpc>
+                <a:spcPct val="90000"/>
+              </a:lnSpc>
+              <a:spcBef>
+                <a:spcPts val="500"/>
+              </a:spcBef>
+              <a:buFont typeface="Arial" panose="020B0604020202020204" pitchFamily="34" charset="0"/>
+              <a:buChar char="•"/>
+            </a:lvl8pPr>
+            <a:lvl9pPr marL="3886200" indent="-228600" defTabSz="914400" latinLnBrk="1">
+              <a:lnSpc>
+                <a:spcPct val="90000"/>
+              </a:lnSpc>
+              <a:spcBef>
+                <a:spcPts val="500"/>
+              </a:spcBef>
+              <a:buFont typeface="Arial" panose="020B0604020202020204" pitchFamily="34" charset="0"/>
+              <a:buChar char="•"/>
+            </a:lvl9pPr>
+          </a:lstStyle>
+          <a:p>
+            <a:r>
+              <a:rPr lang="en-US" altLang="ko-KR" dirty="0" smtClean="0"/>
+              <a:t>Pull Request</a:t>
+            </a:r>
+            <a:r>
+              <a:rPr lang="ko-KR" altLang="en-US" dirty="0" smtClean="0"/>
+              <a:t>란</a:t>
+            </a:r>
+            <a:r>
+              <a:rPr lang="en-US" altLang="ko-KR" dirty="0" smtClean="0"/>
+              <a:t>? (</a:t>
+            </a:r>
+            <a:r>
+              <a:rPr lang="ko-KR" altLang="en-US" dirty="0" smtClean="0"/>
+              <a:t>내 것을 </a:t>
+            </a:r>
+            <a:r>
+              <a:rPr lang="en-US" altLang="ko-KR" dirty="0" smtClean="0"/>
+              <a:t>pull</a:t>
+            </a:r>
+            <a:r>
+              <a:rPr lang="ko-KR" altLang="en-US" dirty="0" smtClean="0"/>
+              <a:t>해서 </a:t>
+            </a:r>
+            <a:r>
+              <a:rPr lang="en-US" altLang="ko-KR" dirty="0" smtClean="0"/>
+              <a:t>merge</a:t>
+            </a:r>
+            <a:r>
+              <a:rPr lang="ko-KR" altLang="en-US" dirty="0" smtClean="0"/>
+              <a:t>해 주세요</a:t>
+            </a:r>
+            <a:r>
+              <a:rPr lang="en-US" altLang="ko-KR" dirty="0" smtClean="0"/>
+              <a:t>!)</a:t>
+            </a:r>
+            <a:endParaRPr lang="en-US" altLang="ko-KR" dirty="0"/>
+          </a:p>
+          <a:p>
+            <a:pPr lvl="1"/>
+            <a:r>
+              <a:rPr lang="en-US" altLang="ko-KR" dirty="0" smtClean="0"/>
+              <a:t>Main</a:t>
+            </a:r>
+            <a:r>
+              <a:rPr lang="ko-KR" altLang="en-US" dirty="0" smtClean="0"/>
+              <a:t>에</a:t>
+            </a:r>
+            <a:r>
+              <a:rPr lang="en-US" altLang="ko-KR" dirty="0" smtClean="0"/>
+              <a:t> </a:t>
+            </a:r>
+            <a:r>
+              <a:rPr lang="ko-KR" altLang="en-US" dirty="0" smtClean="0"/>
+              <a:t>내가 만든 내용을 </a:t>
+            </a:r>
+            <a:r>
+              <a:rPr lang="en-US" altLang="ko-KR" dirty="0" smtClean="0"/>
+              <a:t>merge</a:t>
+            </a:r>
+            <a:r>
+              <a:rPr lang="ko-KR" altLang="en-US" dirty="0" smtClean="0"/>
+              <a:t>시켜달라는 요구</a:t>
+            </a:r>
+            <a:endParaRPr lang="en-US" altLang="ko-KR" dirty="0" smtClean="0"/>
+          </a:p>
+          <a:p>
+            <a:pPr lvl="1"/>
+            <a:r>
+              <a:rPr lang="ko-KR" altLang="en-US" dirty="0" smtClean="0"/>
+              <a:t>올리면 많은 </a:t>
+            </a:r>
+            <a:r>
+              <a:rPr lang="ko-KR" altLang="en-US" dirty="0"/>
+              <a:t> </a:t>
+            </a:r>
+            <a:r>
+              <a:rPr lang="ko-KR" altLang="en-US" dirty="0" smtClean="0"/>
+              <a:t>사람들이 </a:t>
+            </a:r>
+            <a:r>
+              <a:rPr lang="ko-KR" altLang="en-US" dirty="0" err="1" smtClean="0"/>
+              <a:t>코드리뷰를</a:t>
+            </a:r>
+            <a:r>
+              <a:rPr lang="ko-KR" altLang="en-US" dirty="0" smtClean="0"/>
+              <a:t> 통해서 통과가 되면 통합브랜치인 </a:t>
+            </a:r>
+            <a:r>
+              <a:rPr lang="en-US" altLang="ko-KR" dirty="0" smtClean="0"/>
+              <a:t>main</a:t>
+            </a:r>
+            <a:r>
+              <a:rPr lang="ko-KR" altLang="en-US" dirty="0" smtClean="0"/>
+              <a:t>에 </a:t>
+            </a:r>
+            <a:r>
+              <a:rPr lang="en-US" altLang="ko-KR" dirty="0" smtClean="0"/>
+              <a:t>merge</a:t>
+            </a:r>
+            <a:r>
+              <a:rPr lang="ko-KR" altLang="en-US" dirty="0" smtClean="0"/>
+              <a:t>를 하게 되고 이제부터는 다른 </a:t>
+            </a:r>
+            <a:r>
+              <a:rPr lang="ko-KR" altLang="en-US" dirty="0" err="1" smtClean="0"/>
+              <a:t>접속자는</a:t>
+            </a:r>
+            <a:endParaRPr lang="en-US" altLang="ko-KR" dirty="0" smtClean="0"/>
+          </a:p>
+          <a:p>
+            <a:pPr lvl="1"/>
+            <a:r>
+              <a:rPr lang="ko-KR" altLang="en-US" dirty="0" smtClean="0"/>
+              <a:t>이것을 받아서 사용함</a:t>
+            </a:r>
+            <a:endParaRPr lang="en-US" altLang="ko-KR" dirty="0" smtClean="0"/>
+          </a:p>
+          <a:p>
+            <a:pPr lvl="1"/>
+            <a:r>
+              <a:rPr lang="en-US" altLang="ko-KR" dirty="0" smtClean="0"/>
+              <a:t> </a:t>
+            </a:r>
+            <a:r>
+              <a:rPr lang="ko-KR" altLang="en-US" dirty="0" smtClean="0"/>
+              <a:t>두가지가 있음</a:t>
+            </a:r>
+            <a:endParaRPr lang="en-US" altLang="ko-KR" dirty="0" smtClean="0"/>
+          </a:p>
+          <a:p>
+            <a:pPr marL="266700" lvl="1" indent="0">
+              <a:buNone/>
             </a:pPr>
             <a:r>
-              <a:rPr lang="ko-KR" altLang="en-US" dirty="0"/>
-              <a:t>화면 </a:t>
+              <a:rPr lang="en-US" altLang="ko-KR" dirty="0"/>
+              <a:t> </a:t>
+            </a:r>
+            <a:r>
+              <a:rPr lang="en-US" altLang="ko-KR" dirty="0" smtClean="0"/>
+              <a:t>  1. </a:t>
+            </a:r>
+            <a:r>
+              <a:rPr lang="ko-KR" altLang="en-US" dirty="0" smtClean="0"/>
+              <a:t>원격저장소는 내가 권한인 있은 경우 </a:t>
+            </a:r>
+            <a:r>
+              <a:rPr lang="en-US" altLang="ko-KR" dirty="0" smtClean="0"/>
+              <a:t>: </a:t>
+            </a:r>
+            <a:r>
+              <a:rPr lang="ko-KR" altLang="en-US" dirty="0" smtClean="0"/>
+              <a:t>실습 대상</a:t>
             </a:r>
             <a:endParaRPr lang="en-US" altLang="ko-KR" dirty="0" smtClean="0"/>
           </a:p>
           <a:p>
-            <a:pPr marL="609600" lvl="1" indent="-342900">
-              <a:buClr>
-                <a:schemeClr val="tx1">
-                  <a:lumMod val="50000"/>
-                  <a:lumOff val="50000"/>
-                </a:schemeClr>
-              </a:buClr>
-              <a:buFont typeface="+mj-lt"/>
-              <a:buAutoNum type="arabicPeriod"/>
+            <a:pPr marL="266700" lvl="1" indent="0">
+              <a:buNone/>
             </a:pPr>
-            <a:r>
-              <a:rPr lang="ko-KR" altLang="en-US" dirty="0" smtClean="0">
-                <a:solidFill>
-                  <a:srgbClr val="0000FF"/>
-                </a:solidFill>
-              </a:rPr>
-              <a:t>프로젝트</a:t>
+            <a:endParaRPr lang="en-US" altLang="ko-KR" dirty="0"/>
+          </a:p>
+          <a:p>
+            <a:pPr marL="266700" lvl="1" indent="0">
+              <a:buNone/>
+            </a:pPr>
+            <a:r>
+              <a:rPr lang="en-US" altLang="ko-KR" dirty="0" smtClean="0"/>
+              <a:t>  </a:t>
+            </a:r>
+          </a:p>
+          <a:p>
+            <a:pPr marL="266700" lvl="1" indent="0">
+              <a:buNone/>
+            </a:pPr>
+            <a:r>
+              <a:rPr lang="en-US" altLang="ko-KR" dirty="0"/>
+              <a:t> </a:t>
+            </a:r>
+            <a:r>
+              <a:rPr lang="en-US" altLang="ko-KR" dirty="0" smtClean="0"/>
+              <a:t>  2. </a:t>
             </a:r>
             <a:r>
               <a:rPr lang="ko-KR" altLang="en-US" dirty="0" smtClean="0"/>
+              <a:t>오픈소스 방식</a:t>
+            </a:r>
+            <a:endParaRPr lang="en-US" altLang="ko-KR" dirty="0" smtClean="0"/>
+          </a:p>
+          <a:p>
+            <a:pPr marL="266700" lvl="1" indent="0">
+              <a:buNone/>
+            </a:pPr>
+            <a:r>
+              <a:rPr lang="en-US" altLang="ko-KR" dirty="0"/>
               <a:t> </a:t>
             </a:r>
             <a:r>
-              <a:rPr lang="ko-KR" altLang="en-US" dirty="0"/>
-              <a:t>이름 입력</a:t>
-            </a:r>
-            <a:r>
-              <a:rPr lang="en-US" altLang="ko-KR" dirty="0"/>
-              <a:t>: </a:t>
+              <a:rPr lang="en-US" altLang="ko-KR" dirty="0" smtClean="0"/>
+              <a:t>     </a:t>
+            </a:r>
+            <a:r>
+              <a:rPr lang="ko-KR" altLang="en-US" dirty="0" smtClean="0"/>
+              <a:t>남의 </a:t>
+            </a:r>
+            <a:r>
+              <a:rPr lang="ko-KR" altLang="en-US" dirty="0" err="1" smtClean="0"/>
+              <a:t>원격저장소</a:t>
+            </a:r>
+            <a:r>
+              <a:rPr lang="ko-KR" altLang="en-US" dirty="0" smtClean="0"/>
+              <a:t> 권한이 없음</a:t>
+            </a:r>
+            <a:r>
+              <a:rPr lang="en-US" altLang="ko-KR" dirty="0" smtClean="0"/>
+              <a:t>. </a:t>
+            </a:r>
+            <a:r>
+              <a:rPr lang="ko-KR" altLang="en-US" dirty="0" smtClean="0"/>
+              <a:t>남의 저장소 내용을 </a:t>
+            </a:r>
+            <a:r>
+              <a:rPr lang="en-US" altLang="ko-KR" dirty="0" smtClean="0"/>
+              <a:t>Fork</a:t>
+            </a:r>
+            <a:r>
+              <a:rPr lang="ko-KR" altLang="en-US" dirty="0" smtClean="0"/>
+              <a:t>해서 내 </a:t>
+            </a:r>
+            <a:r>
+              <a:rPr lang="en-US" altLang="ko-KR" dirty="0" smtClean="0"/>
+              <a:t>pc</a:t>
+            </a:r>
+            <a:r>
+              <a:rPr lang="ko-KR" altLang="en-US" dirty="0" smtClean="0"/>
+              <a:t>에서 작업하고 내 원격저장소에 보내서 그곳에서 남의 저장소에 </a:t>
+            </a:r>
+            <a:r>
+              <a:rPr lang="en-US" altLang="ko-KR" dirty="0" smtClean="0"/>
+              <a:t>pull request</a:t>
+            </a:r>
+            <a:r>
+              <a:rPr lang="ko-KR" altLang="en-US" dirty="0" smtClean="0"/>
+              <a:t>하게 됨</a:t>
             </a:r>
             <a:endParaRPr lang="en-US" altLang="ko-KR" dirty="0" smtClean="0"/>
-          </a:p>
-          <a:p>
-            <a:endParaRPr lang="ko-KR" altLang="en-US" dirty="0"/>
           </a:p>
         </p:txBody>
       </p:sp>
     </p:spTree>
     <p:extLst>
       <p:ext uri="{BB962C8B-B14F-4D97-AF65-F5344CB8AC3E}">
-        <p14:creationId xmlns:p14="http://schemas.microsoft.com/office/powerpoint/2010/main" val="2239061091"/>
+        <p14:creationId xmlns:p14="http://schemas.microsoft.com/office/powerpoint/2010/main" val="2382322175"/>
       </p:ext>
     </p:extLst>
   </p:cSld>
@@ -15341,6 +15389,878 @@
     <p:extLst>
       <p:ext uri="{BB962C8B-B14F-4D97-AF65-F5344CB8AC3E}">
         <p14:creationId xmlns:p14="http://schemas.microsoft.com/office/powerpoint/2010/main" val="64994849"/>
+      </p:ext>
+    </p:extLst>
+  </p:cSld>
+  <p:clrMapOvr>
+    <a:masterClrMapping/>
+  </p:clrMapOvr>
+</p:sld>
+</file>
+
+<file path=ppt/slides/slide30.xml><?xml version="1.0" encoding="utf-8"?>
+<p:sld xmlns:a="http://schemas.openxmlformats.org/drawingml/2006/main" xmlns:r="http://schemas.openxmlformats.org/officeDocument/2006/relationships" xmlns:p="http://schemas.openxmlformats.org/presentationml/2006/main">
+  <p:cSld>
+    <p:spTree>
+      <p:nvGrpSpPr>
+        <p:cNvPr id="1" name=""/>
+        <p:cNvGrpSpPr/>
+        <p:nvPr/>
+      </p:nvGrpSpPr>
+      <p:grpSpPr>
+        <a:xfrm>
+          <a:off x="0" y="0"/>
+          <a:ext cx="0" cy="0"/>
+          <a:chOff x="0" y="0"/>
+          <a:chExt cx="0" cy="0"/>
+        </a:xfrm>
+      </p:grpSpPr>
+      <p:sp>
+        <p:nvSpPr>
+          <p:cNvPr id="4" name="제목 3">
+            <a:extLst>
+              <a:ext uri="{FF2B5EF4-FFF2-40B4-BE49-F238E27FC236}">
+                <a16:creationId xmlns:a16="http://schemas.microsoft.com/office/drawing/2014/main" id="{F0CEB32B-CB43-4410-BA08-A97E4BC47FCB}"/>
+              </a:ext>
+            </a:extLst>
+          </p:cNvPr>
+          <p:cNvSpPr>
+            <a:spLocks noGrp="1"/>
+          </p:cNvSpPr>
+          <p:nvPr>
+            <p:ph type="title"/>
+          </p:nvPr>
+        </p:nvSpPr>
+        <p:spPr/>
+        <p:txBody>
+          <a:bodyPr/>
+          <a:lstStyle/>
+          <a:p>
+            <a:r>
+              <a:rPr lang="en-US" altLang="ko-KR" dirty="0" smtClean="0"/>
+              <a:t>Pull Request</a:t>
+            </a:r>
+            <a:endParaRPr lang="ko-KR" altLang="en-US" dirty="0"/>
+          </a:p>
+        </p:txBody>
+      </p:sp>
+      <p:sp>
+        <p:nvSpPr>
+          <p:cNvPr id="7" name="내용 개체 틀 2">
+            <a:extLst>
+              <a:ext uri="{FF2B5EF4-FFF2-40B4-BE49-F238E27FC236}">
+                <a16:creationId xmlns:a16="http://schemas.microsoft.com/office/drawing/2014/main" id="{A44AC902-3746-40D6-9827-94B46EEDDC67}"/>
+              </a:ext>
+            </a:extLst>
+          </p:cNvPr>
+          <p:cNvSpPr txBox="1">
+            <a:spLocks/>
+          </p:cNvSpPr>
+          <p:nvPr/>
+        </p:nvSpPr>
+        <p:spPr>
+          <a:xfrm>
+            <a:off x="341787" y="1120544"/>
+            <a:ext cx="8642350" cy="4779215"/>
+          </a:xfrm>
+          <a:prstGeom prst="rect">
+            <a:avLst/>
+          </a:prstGeom>
+        </p:spPr>
+        <p:txBody>
+          <a:bodyPr vert="horz" lIns="91440" tIns="45720" rIns="91440" bIns="45720" rtlCol="0">
+            <a:noAutofit/>
+          </a:bodyPr>
+          <a:lstStyle>
+            <a:lvl1pPr marL="266700" indent="-266700" defTabSz="914400" latinLnBrk="1">
+              <a:lnSpc>
+                <a:spcPct val="150000"/>
+              </a:lnSpc>
+              <a:spcBef>
+                <a:spcPct val="0"/>
+              </a:spcBef>
+              <a:buClr>
+                <a:schemeClr val="tx1">
+                  <a:lumMod val="65000"/>
+                  <a:lumOff val="35000"/>
+                </a:schemeClr>
+              </a:buClr>
+              <a:buFont typeface="Wingdings" pitchFamily="2" charset="2"/>
+              <a:buChar char="n"/>
+              <a:defRPr sz="2000" b="1">
+                <a:latin typeface="+mn-ea"/>
+              </a:defRPr>
+            </a:lvl1pPr>
+            <a:lvl2pPr marL="447675" lvl="1" indent="-180975" defTabSz="914400" latinLnBrk="1">
+              <a:lnSpc>
+                <a:spcPct val="150000"/>
+              </a:lnSpc>
+              <a:spcBef>
+                <a:spcPts val="0"/>
+              </a:spcBef>
+              <a:spcAft>
+                <a:spcPts val="0"/>
+              </a:spcAft>
+              <a:buClr>
+                <a:schemeClr val="tx1">
+                  <a:lumMod val="50000"/>
+                  <a:lumOff val="50000"/>
+                </a:schemeClr>
+              </a:buClr>
+              <a:buFont typeface="Wingdings" pitchFamily="2" charset="2"/>
+              <a:buChar char="§"/>
+              <a:defRPr sz="1600"/>
+            </a:lvl2pPr>
+            <a:lvl3pPr marL="628650" indent="-180975" defTabSz="914400" latinLnBrk="1">
+              <a:lnSpc>
+                <a:spcPct val="150000"/>
+              </a:lnSpc>
+              <a:spcBef>
+                <a:spcPts val="500"/>
+              </a:spcBef>
+              <a:spcAft>
+                <a:spcPts val="300"/>
+              </a:spcAft>
+              <a:buClr>
+                <a:schemeClr val="tx1">
+                  <a:lumMod val="65000"/>
+                  <a:lumOff val="35000"/>
+                </a:schemeClr>
+              </a:buClr>
+              <a:buFont typeface="Arial" panose="020B0604020202020204" pitchFamily="34" charset="0"/>
+              <a:buChar char="•"/>
+              <a:defRPr sz="1400"/>
+            </a:lvl3pPr>
+            <a:lvl4pPr marL="809625" indent="-180975" defTabSz="914400" latinLnBrk="1">
+              <a:lnSpc>
+                <a:spcPct val="150000"/>
+              </a:lnSpc>
+              <a:spcBef>
+                <a:spcPts val="500"/>
+              </a:spcBef>
+              <a:spcAft>
+                <a:spcPts val="300"/>
+              </a:spcAft>
+              <a:buClr>
+                <a:schemeClr val="tx1">
+                  <a:lumMod val="65000"/>
+                  <a:lumOff val="35000"/>
+                </a:schemeClr>
+              </a:buClr>
+              <a:buSzPct val="96000"/>
+              <a:buFont typeface="Arial" panose="020B0604020202020204" pitchFamily="34" charset="0"/>
+              <a:buChar char="•"/>
+              <a:defRPr sz="1200"/>
+            </a:lvl4pPr>
+            <a:lvl5pPr marL="990600" indent="-180975" defTabSz="914400" latinLnBrk="1">
+              <a:lnSpc>
+                <a:spcPct val="150000"/>
+              </a:lnSpc>
+              <a:spcBef>
+                <a:spcPts val="500"/>
+              </a:spcBef>
+              <a:buClr>
+                <a:schemeClr val="tx1">
+                  <a:lumMod val="65000"/>
+                  <a:lumOff val="35000"/>
+                </a:schemeClr>
+              </a:buClr>
+              <a:buFont typeface="Arial" panose="020B0604020202020204" pitchFamily="34" charset="0"/>
+              <a:buChar char="•"/>
+              <a:defRPr sz="1000"/>
+            </a:lvl5pPr>
+            <a:lvl6pPr marL="2514600" indent="-228600" defTabSz="914400" latinLnBrk="1">
+              <a:lnSpc>
+                <a:spcPct val="90000"/>
+              </a:lnSpc>
+              <a:spcBef>
+                <a:spcPts val="500"/>
+              </a:spcBef>
+              <a:buFont typeface="Arial" panose="020B0604020202020204" pitchFamily="34" charset="0"/>
+              <a:buChar char="•"/>
+            </a:lvl6pPr>
+            <a:lvl7pPr marL="2971800" indent="-228600" defTabSz="914400" latinLnBrk="1">
+              <a:lnSpc>
+                <a:spcPct val="90000"/>
+              </a:lnSpc>
+              <a:spcBef>
+                <a:spcPts val="500"/>
+              </a:spcBef>
+              <a:buFont typeface="Arial" panose="020B0604020202020204" pitchFamily="34" charset="0"/>
+              <a:buChar char="•"/>
+            </a:lvl7pPr>
+            <a:lvl8pPr marL="3429000" indent="-228600" defTabSz="914400" latinLnBrk="1">
+              <a:lnSpc>
+                <a:spcPct val="90000"/>
+              </a:lnSpc>
+              <a:spcBef>
+                <a:spcPts val="500"/>
+              </a:spcBef>
+              <a:buFont typeface="Arial" panose="020B0604020202020204" pitchFamily="34" charset="0"/>
+              <a:buChar char="•"/>
+            </a:lvl8pPr>
+            <a:lvl9pPr marL="3886200" indent="-228600" defTabSz="914400" latinLnBrk="1">
+              <a:lnSpc>
+                <a:spcPct val="90000"/>
+              </a:lnSpc>
+              <a:spcBef>
+                <a:spcPts val="500"/>
+              </a:spcBef>
+              <a:buFont typeface="Arial" panose="020B0604020202020204" pitchFamily="34" charset="0"/>
+              <a:buChar char="•"/>
+            </a:lvl9pPr>
+          </a:lstStyle>
+          <a:p>
+            <a:r>
+              <a:rPr lang="en-US" altLang="ko-KR" dirty="0" smtClean="0"/>
+              <a:t>Pull Request </a:t>
+            </a:r>
+            <a:r>
+              <a:rPr lang="ko-KR" altLang="en-US" dirty="0" smtClean="0"/>
+              <a:t>동작 순서</a:t>
+            </a:r>
+            <a:endParaRPr lang="en-US" altLang="ko-KR" dirty="0"/>
+          </a:p>
+          <a:p>
+            <a:pPr lvl="1"/>
+            <a:r>
+              <a:rPr lang="en-US" altLang="ko-KR" dirty="0" err="1" smtClean="0"/>
+              <a:t>Github</a:t>
+            </a:r>
+            <a:r>
+              <a:rPr lang="en-US" altLang="ko-KR" dirty="0" smtClean="0"/>
+              <a:t> </a:t>
+            </a:r>
+            <a:r>
+              <a:rPr lang="ko-KR" altLang="en-US" dirty="0" smtClean="0"/>
+              <a:t>그림으로 순서도 삽입</a:t>
+            </a:r>
+            <a:endParaRPr lang="en-US" altLang="ko-KR" dirty="0" smtClean="0"/>
+          </a:p>
+          <a:p>
+            <a:pPr lvl="1"/>
+            <a:r>
+              <a:rPr lang="ko-KR" altLang="en-US" dirty="0" smtClean="0"/>
+              <a:t> 마지막에 로컬저장소에서 </a:t>
+            </a:r>
+            <a:r>
+              <a:rPr lang="en-US" altLang="ko-KR" dirty="0" err="1" smtClean="0"/>
+              <a:t>git</a:t>
+            </a:r>
+            <a:r>
+              <a:rPr lang="en-US" altLang="ko-KR" dirty="0" smtClean="0"/>
+              <a:t> pull</a:t>
+            </a:r>
+            <a:r>
+              <a:rPr lang="ko-KR" altLang="en-US" dirty="0" smtClean="0"/>
+              <a:t>을 하면 보이는 모양을 확인</a:t>
+            </a:r>
+            <a:endParaRPr lang="en-US" altLang="ko-KR" dirty="0"/>
+          </a:p>
+          <a:p>
+            <a:pPr marL="266700" lvl="1" indent="0">
+              <a:buNone/>
+            </a:pPr>
+            <a:r>
+              <a:rPr lang="en-US" altLang="ko-KR" dirty="0" smtClean="0"/>
+              <a:t>  </a:t>
+            </a:r>
+          </a:p>
+        </p:txBody>
+      </p:sp>
+    </p:spTree>
+    <p:extLst>
+      <p:ext uri="{BB962C8B-B14F-4D97-AF65-F5344CB8AC3E}">
+        <p14:creationId xmlns:p14="http://schemas.microsoft.com/office/powerpoint/2010/main" val="3768842790"/>
+      </p:ext>
+    </p:extLst>
+  </p:cSld>
+  <p:clrMapOvr>
+    <a:masterClrMapping/>
+  </p:clrMapOvr>
+</p:sld>
+</file>
+
+<file path=ppt/slides/slide31.xml><?xml version="1.0" encoding="utf-8"?>
+<p:sld xmlns:a="http://schemas.openxmlformats.org/drawingml/2006/main" xmlns:r="http://schemas.openxmlformats.org/officeDocument/2006/relationships" xmlns:p="http://schemas.openxmlformats.org/presentationml/2006/main">
+  <p:cSld>
+    <p:spTree>
+      <p:nvGrpSpPr>
+        <p:cNvPr id="1" name=""/>
+        <p:cNvGrpSpPr/>
+        <p:nvPr/>
+      </p:nvGrpSpPr>
+      <p:grpSpPr>
+        <a:xfrm>
+          <a:off x="0" y="0"/>
+          <a:ext cx="0" cy="0"/>
+          <a:chOff x="0" y="0"/>
+          <a:chExt cx="0" cy="0"/>
+        </a:xfrm>
+      </p:grpSpPr>
+      <p:sp>
+        <p:nvSpPr>
+          <p:cNvPr id="4" name="제목 3">
+            <a:extLst>
+              <a:ext uri="{FF2B5EF4-FFF2-40B4-BE49-F238E27FC236}">
+                <a16:creationId xmlns:a16="http://schemas.microsoft.com/office/drawing/2014/main" id="{F0CEB32B-CB43-4410-BA08-A97E4BC47FCB}"/>
+              </a:ext>
+            </a:extLst>
+          </p:cNvPr>
+          <p:cNvSpPr>
+            <a:spLocks noGrp="1"/>
+          </p:cNvSpPr>
+          <p:nvPr>
+            <p:ph type="title"/>
+          </p:nvPr>
+        </p:nvSpPr>
+        <p:spPr/>
+        <p:txBody>
+          <a:bodyPr/>
+          <a:lstStyle/>
+          <a:p>
+            <a:r>
+              <a:rPr lang="ko-KR" altLang="en-US" dirty="0" smtClean="0"/>
+              <a:t>협업시작하기</a:t>
+            </a:r>
+            <a:endParaRPr lang="ko-KR" altLang="en-US" dirty="0"/>
+          </a:p>
+        </p:txBody>
+      </p:sp>
+      <p:sp>
+        <p:nvSpPr>
+          <p:cNvPr id="5" name="내용 개체 틀 4">
+            <a:extLst>
+              <a:ext uri="{FF2B5EF4-FFF2-40B4-BE49-F238E27FC236}">
+                <a16:creationId xmlns:a16="http://schemas.microsoft.com/office/drawing/2014/main" id="{FDF69C25-9F43-470B-8A20-AEDC0F371CCD}"/>
+              </a:ext>
+            </a:extLst>
+          </p:cNvPr>
+          <p:cNvSpPr>
+            <a:spLocks noGrp="1"/>
+          </p:cNvSpPr>
+          <p:nvPr>
+            <p:ph idx="1"/>
+          </p:nvPr>
+        </p:nvSpPr>
+        <p:spPr>
+          <a:xfrm>
+            <a:off x="250825" y="1000221"/>
+            <a:ext cx="8641655" cy="2996743"/>
+          </a:xfrm>
+        </p:spPr>
+        <p:txBody>
+          <a:bodyPr tIns="0" bIns="0">
+            <a:noAutofit/>
+          </a:bodyPr>
+          <a:lstStyle/>
+          <a:p>
+            <a:pPr>
+              <a:buClr>
+                <a:schemeClr val="tx1">
+                  <a:lumMod val="65000"/>
+                  <a:lumOff val="35000"/>
+                </a:schemeClr>
+              </a:buClr>
+              <a:defRPr/>
+            </a:pPr>
+            <a:r>
+              <a:rPr lang="ko-KR" altLang="en-US" dirty="0"/>
+              <a:t>프로젝트 만들기</a:t>
+            </a:r>
+          </a:p>
+          <a:p>
+            <a:pPr marL="609600" lvl="1" indent="-342900">
+              <a:buClr>
+                <a:schemeClr val="tx1">
+                  <a:lumMod val="65000"/>
+                  <a:lumOff val="35000"/>
+                </a:schemeClr>
+              </a:buClr>
+              <a:buFont typeface="+mj-ea"/>
+              <a:buAutoNum type="circleNumDbPlain"/>
+              <a:defRPr/>
+            </a:pPr>
+            <a:r>
+              <a:rPr lang="en-US" altLang="ko-KR" dirty="0" err="1" smtClean="0"/>
+              <a:t>Github</a:t>
+            </a:r>
+            <a:r>
+              <a:rPr lang="en-US" altLang="ko-KR" dirty="0" smtClean="0"/>
+              <a:t> </a:t>
+            </a:r>
+            <a:r>
+              <a:rPr lang="ko-KR" altLang="en-US" dirty="0" smtClean="0"/>
+              <a:t>등록</a:t>
+            </a:r>
+            <a:endParaRPr lang="en-US" altLang="ko-KR" dirty="0"/>
+          </a:p>
+          <a:p>
+            <a:pPr marL="609600" lvl="1" indent="-342900">
+              <a:buClr>
+                <a:schemeClr val="tx1">
+                  <a:lumMod val="65000"/>
+                  <a:lumOff val="35000"/>
+                </a:schemeClr>
+              </a:buClr>
+              <a:buFont typeface="+mj-ea"/>
+              <a:buAutoNum type="circleNumDbPlain"/>
+              <a:defRPr/>
+            </a:pPr>
+            <a:r>
+              <a:rPr lang="en-US" altLang="ko-KR" dirty="0" smtClean="0"/>
+              <a:t>P</a:t>
+            </a:r>
+            <a:endParaRPr lang="en-US" altLang="ko-KR" dirty="0"/>
+          </a:p>
+          <a:p>
+            <a:pPr marL="609600" lvl="1" indent="-342900">
+              <a:buClr>
+                <a:schemeClr val="tx1">
+                  <a:lumMod val="65000"/>
+                  <a:lumOff val="35000"/>
+                </a:schemeClr>
+              </a:buClr>
+              <a:buFont typeface="+mj-ea"/>
+              <a:buAutoNum type="circleNumDbPlain"/>
+              <a:defRPr/>
+            </a:pPr>
+            <a:r>
+              <a:rPr lang="en-US" altLang="ko-KR" dirty="0"/>
+              <a:t> </a:t>
+            </a:r>
+            <a:endParaRPr lang="en-US" altLang="ko-KR" dirty="0"/>
+          </a:p>
+          <a:p>
+            <a:pPr marL="609600" lvl="1" indent="-342900">
+              <a:buClr>
+                <a:schemeClr val="tx1">
+                  <a:lumMod val="65000"/>
+                  <a:lumOff val="35000"/>
+                </a:schemeClr>
+              </a:buClr>
+              <a:buFont typeface="+mj-ea"/>
+              <a:buAutoNum type="circleNumDbPlain"/>
+              <a:defRPr/>
+            </a:pPr>
+            <a:r>
+              <a:rPr lang="en-US" altLang="ko-KR" dirty="0"/>
+              <a:t> </a:t>
+            </a:r>
+            <a:endParaRPr lang="en-US" altLang="ko-KR" dirty="0"/>
+          </a:p>
+          <a:p>
+            <a:pPr marL="609600" lvl="1" indent="-342900">
+              <a:buClr>
+                <a:schemeClr val="tx1">
+                  <a:lumMod val="65000"/>
+                  <a:lumOff val="35000"/>
+                </a:schemeClr>
+              </a:buClr>
+              <a:buFont typeface="+mj-ea"/>
+              <a:buAutoNum type="circleNumDbPlain"/>
+              <a:defRPr/>
+            </a:pPr>
+            <a:r>
+              <a:rPr lang="en-US" altLang="ko-KR" dirty="0"/>
+              <a:t> </a:t>
+            </a:r>
+            <a:endParaRPr lang="en-US" altLang="ko-KR" dirty="0" smtClean="0"/>
+          </a:p>
+          <a:p>
+            <a:pPr marL="609600" lvl="1" indent="-342900">
+              <a:buClr>
+                <a:schemeClr val="tx1">
+                  <a:lumMod val="65000"/>
+                  <a:lumOff val="35000"/>
+                </a:schemeClr>
+              </a:buClr>
+              <a:buFont typeface="+mj-ea"/>
+              <a:buAutoNum type="circleNumDbPlain"/>
+              <a:defRPr/>
+            </a:pPr>
+            <a:r>
+              <a:rPr lang="en-US" altLang="ko-KR" dirty="0" smtClean="0">
+                <a:solidFill>
+                  <a:srgbClr val="FF0000"/>
+                </a:solidFill>
+              </a:rPr>
+              <a:t>Clone</a:t>
+            </a:r>
+            <a:r>
+              <a:rPr lang="ko-KR" altLang="en-US" dirty="0" smtClean="0">
+                <a:solidFill>
+                  <a:srgbClr val="FF0000"/>
+                </a:solidFill>
+              </a:rPr>
+              <a:t>과 </a:t>
+            </a:r>
+            <a:r>
+              <a:rPr lang="en-US" altLang="ko-KR" dirty="0" smtClean="0">
+                <a:solidFill>
+                  <a:srgbClr val="FF0000"/>
+                </a:solidFill>
+              </a:rPr>
+              <a:t>pull</a:t>
+            </a:r>
+            <a:r>
+              <a:rPr lang="ko-KR" altLang="en-US" dirty="0" smtClean="0">
+                <a:solidFill>
+                  <a:srgbClr val="FF0000"/>
+                </a:solidFill>
+              </a:rPr>
+              <a:t>이</a:t>
+            </a:r>
+            <a:r>
+              <a:rPr lang="en-US" altLang="ko-KR" dirty="0" smtClean="0">
+                <a:solidFill>
+                  <a:srgbClr val="FF0000"/>
+                </a:solidFill>
+              </a:rPr>
+              <a:t> </a:t>
+            </a:r>
+            <a:r>
+              <a:rPr lang="ko-KR" altLang="en-US" dirty="0" smtClean="0">
+                <a:solidFill>
+                  <a:srgbClr val="FF0000"/>
+                </a:solidFill>
+              </a:rPr>
+              <a:t>차이</a:t>
+            </a:r>
+            <a:r>
+              <a:rPr lang="en-US" altLang="ko-KR" dirty="0" smtClean="0">
+                <a:solidFill>
+                  <a:srgbClr val="FF0000"/>
+                </a:solidFill>
+              </a:rPr>
+              <a:t>, </a:t>
+            </a:r>
+            <a:r>
+              <a:rPr lang="ko-KR" altLang="en-US" dirty="0" smtClean="0">
+                <a:solidFill>
+                  <a:srgbClr val="FF0000"/>
+                </a:solidFill>
+              </a:rPr>
+              <a:t>로컬에서 자동 </a:t>
+            </a:r>
+            <a:r>
+              <a:rPr lang="ko-KR" altLang="en-US" dirty="0" smtClean="0">
+                <a:solidFill>
+                  <a:srgbClr val="FF0000"/>
+                </a:solidFill>
+              </a:rPr>
+              <a:t>연결 삭제 방법 확인</a:t>
+            </a:r>
+            <a:endParaRPr lang="en-US" altLang="ko-KR" dirty="0">
+              <a:solidFill>
+                <a:srgbClr val="FF0000"/>
+              </a:solidFill>
+            </a:endParaRPr>
+          </a:p>
+          <a:p>
+            <a:endParaRPr lang="ko-KR" altLang="en-US" dirty="0">
+              <a:solidFill>
+                <a:srgbClr val="FF0000"/>
+              </a:solidFill>
+            </a:endParaRPr>
+          </a:p>
+        </p:txBody>
+      </p:sp>
+      <p:sp>
+        <p:nvSpPr>
+          <p:cNvPr id="6" name="내용 개체 틀 4">
+            <a:extLst>
+              <a:ext uri="{FF2B5EF4-FFF2-40B4-BE49-F238E27FC236}">
+                <a16:creationId xmlns:a16="http://schemas.microsoft.com/office/drawing/2014/main" id="{59FE1F7F-BB82-4587-A86F-471C542D6EA7}"/>
+              </a:ext>
+            </a:extLst>
+          </p:cNvPr>
+          <p:cNvSpPr txBox="1">
+            <a:spLocks/>
+          </p:cNvSpPr>
+          <p:nvPr/>
+        </p:nvSpPr>
+        <p:spPr>
+          <a:xfrm>
+            <a:off x="250825" y="4506993"/>
+            <a:ext cx="8641655" cy="1526162"/>
+          </a:xfrm>
+          <a:prstGeom prst="rect">
+            <a:avLst/>
+          </a:prstGeom>
+        </p:spPr>
+        <p:txBody>
+          <a:bodyPr vert="horz" lIns="91440" tIns="0" rIns="91440" bIns="0" rtlCol="0">
+            <a:noAutofit/>
+          </a:bodyPr>
+          <a:lstStyle>
+            <a:lvl1pPr marL="266700" indent="-266700" algn="l" defTabSz="914400" rtl="0" eaLnBrk="1" latinLnBrk="1" hangingPunct="1">
+              <a:lnSpc>
+                <a:spcPct val="150000"/>
+              </a:lnSpc>
+              <a:spcBef>
+                <a:spcPts val="0"/>
+              </a:spcBef>
+              <a:buClr>
+                <a:schemeClr val="accent4"/>
+              </a:buClr>
+              <a:buFont typeface="Wingdings" pitchFamily="2" charset="2"/>
+              <a:buChar char="n"/>
+              <a:defRPr sz="2000" b="1" kern="1200">
+                <a:solidFill>
+                  <a:schemeClr val="tx1"/>
+                </a:solidFill>
+                <a:latin typeface="+mn-ea"/>
+                <a:ea typeface="+mn-ea"/>
+                <a:cs typeface="+mn-cs"/>
+              </a:defRPr>
+            </a:lvl1pPr>
+            <a:lvl2pPr marL="447675" indent="-180975" algn="l" defTabSz="914400" rtl="0" eaLnBrk="1" latinLnBrk="1" hangingPunct="1">
+              <a:lnSpc>
+                <a:spcPct val="150000"/>
+              </a:lnSpc>
+              <a:spcBef>
+                <a:spcPts val="500"/>
+              </a:spcBef>
+              <a:spcAft>
+                <a:spcPts val="400"/>
+              </a:spcAft>
+              <a:buClr>
+                <a:schemeClr val="accent4"/>
+              </a:buClr>
+              <a:buFont typeface="Wingdings" pitchFamily="2" charset="2"/>
+              <a:buChar char="§"/>
+              <a:defRPr sz="1600" kern="1200">
+                <a:solidFill>
+                  <a:schemeClr val="tx1"/>
+                </a:solidFill>
+                <a:latin typeface="+mn-lt"/>
+                <a:ea typeface="+mn-ea"/>
+                <a:cs typeface="+mn-cs"/>
+              </a:defRPr>
+            </a:lvl2pPr>
+            <a:lvl3pPr marL="628650" indent="-180975" algn="l" defTabSz="914400" rtl="0" eaLnBrk="1" latinLnBrk="1" hangingPunct="1">
+              <a:lnSpc>
+                <a:spcPct val="150000"/>
+              </a:lnSpc>
+              <a:spcBef>
+                <a:spcPts val="500"/>
+              </a:spcBef>
+              <a:spcAft>
+                <a:spcPts val="300"/>
+              </a:spcAft>
+              <a:buClr>
+                <a:schemeClr val="accent4"/>
+              </a:buClr>
+              <a:buFont typeface="Arial" panose="020B0604020202020204" pitchFamily="34" charset="0"/>
+              <a:buChar char="•"/>
+              <a:defRPr sz="1400" kern="1200">
+                <a:solidFill>
+                  <a:schemeClr val="tx1"/>
+                </a:solidFill>
+                <a:latin typeface="+mn-lt"/>
+                <a:ea typeface="+mn-ea"/>
+                <a:cs typeface="+mn-cs"/>
+              </a:defRPr>
+            </a:lvl3pPr>
+            <a:lvl4pPr marL="809625" indent="-180975" algn="l" defTabSz="914400" rtl="0" eaLnBrk="1" latinLnBrk="1" hangingPunct="1">
+              <a:lnSpc>
+                <a:spcPct val="150000"/>
+              </a:lnSpc>
+              <a:spcBef>
+                <a:spcPts val="500"/>
+              </a:spcBef>
+              <a:spcAft>
+                <a:spcPts val="300"/>
+              </a:spcAft>
+              <a:buClr>
+                <a:schemeClr val="accent4"/>
+              </a:buClr>
+              <a:buSzPct val="96000"/>
+              <a:buFont typeface="Arial" panose="020B0604020202020204" pitchFamily="34" charset="0"/>
+              <a:buChar char="•"/>
+              <a:defRPr sz="1200" kern="1200">
+                <a:solidFill>
+                  <a:schemeClr val="tx1"/>
+                </a:solidFill>
+                <a:latin typeface="+mn-lt"/>
+                <a:ea typeface="+mn-ea"/>
+                <a:cs typeface="+mn-cs"/>
+              </a:defRPr>
+            </a:lvl4pPr>
+            <a:lvl5pPr marL="990600" indent="-180975" algn="l" defTabSz="914400" rtl="0" eaLnBrk="1" latinLnBrk="1" hangingPunct="1">
+              <a:lnSpc>
+                <a:spcPct val="150000"/>
+              </a:lnSpc>
+              <a:spcBef>
+                <a:spcPts val="500"/>
+              </a:spcBef>
+              <a:buClr>
+                <a:schemeClr val="accent4"/>
+              </a:buClr>
+              <a:buFont typeface="Arial" panose="020B0604020202020204" pitchFamily="34" charset="0"/>
+              <a:buChar char="•"/>
+              <a:defRPr sz="1000" kern="1200">
+                <a:solidFill>
+                  <a:schemeClr val="tx1"/>
+                </a:solidFill>
+                <a:latin typeface="+mn-lt"/>
+                <a:ea typeface="+mn-ea"/>
+                <a:cs typeface="+mn-cs"/>
+              </a:defRPr>
+            </a:lvl5pPr>
+            <a:lvl6pPr marL="2514600" indent="-228600" algn="l" defTabSz="914400" rtl="0" eaLnBrk="1" latinLnBrk="1" hangingPunct="1">
+              <a:lnSpc>
+                <a:spcPct val="90000"/>
+              </a:lnSpc>
+              <a:spcBef>
+                <a:spcPts val="500"/>
+              </a:spcBef>
+              <a:buFont typeface="Arial" panose="020B0604020202020204" pitchFamily="34" charset="0"/>
+              <a:buChar char="•"/>
+              <a:defRPr sz="1800" kern="1200">
+                <a:solidFill>
+                  <a:schemeClr val="tx1"/>
+                </a:solidFill>
+                <a:latin typeface="+mn-lt"/>
+                <a:ea typeface="+mn-ea"/>
+                <a:cs typeface="+mn-cs"/>
+              </a:defRPr>
+            </a:lvl6pPr>
+            <a:lvl7pPr marL="2971800" indent="-228600" algn="l" defTabSz="914400" rtl="0" eaLnBrk="1" latinLnBrk="1" hangingPunct="1">
+              <a:lnSpc>
+                <a:spcPct val="90000"/>
+              </a:lnSpc>
+              <a:spcBef>
+                <a:spcPts val="500"/>
+              </a:spcBef>
+              <a:buFont typeface="Arial" panose="020B0604020202020204" pitchFamily="34" charset="0"/>
+              <a:buChar char="•"/>
+              <a:defRPr sz="1800" kern="1200">
+                <a:solidFill>
+                  <a:schemeClr val="tx1"/>
+                </a:solidFill>
+                <a:latin typeface="+mn-lt"/>
+                <a:ea typeface="+mn-ea"/>
+                <a:cs typeface="+mn-cs"/>
+              </a:defRPr>
+            </a:lvl7pPr>
+            <a:lvl8pPr marL="3429000" indent="-228600" algn="l" defTabSz="914400" rtl="0" eaLnBrk="1" latinLnBrk="1" hangingPunct="1">
+              <a:lnSpc>
+                <a:spcPct val="90000"/>
+              </a:lnSpc>
+              <a:spcBef>
+                <a:spcPts val="500"/>
+              </a:spcBef>
+              <a:buFont typeface="Arial" panose="020B0604020202020204" pitchFamily="34" charset="0"/>
+              <a:buChar char="•"/>
+              <a:defRPr sz="1800" kern="1200">
+                <a:solidFill>
+                  <a:schemeClr val="tx1"/>
+                </a:solidFill>
+                <a:latin typeface="+mn-lt"/>
+                <a:ea typeface="+mn-ea"/>
+                <a:cs typeface="+mn-cs"/>
+              </a:defRPr>
+            </a:lvl8pPr>
+            <a:lvl9pPr marL="3886200" indent="-228600" algn="l" defTabSz="914400" rtl="0" eaLnBrk="1" latinLnBrk="1" hangingPunct="1">
+              <a:lnSpc>
+                <a:spcPct val="90000"/>
+              </a:lnSpc>
+              <a:spcBef>
+                <a:spcPts val="500"/>
+              </a:spcBef>
+              <a:buFont typeface="Arial" panose="020B0604020202020204" pitchFamily="34" charset="0"/>
+              <a:buChar char="•"/>
+              <a:defRPr sz="1800" kern="1200">
+                <a:solidFill>
+                  <a:schemeClr val="tx1"/>
+                </a:solidFill>
+                <a:latin typeface="+mn-lt"/>
+                <a:ea typeface="+mn-ea"/>
+                <a:cs typeface="+mn-cs"/>
+              </a:defRPr>
+            </a:lvl9pPr>
+          </a:lstStyle>
+          <a:p>
+            <a:pPr marL="457200" indent="-457200">
+              <a:spcBef>
+                <a:spcPct val="0"/>
+              </a:spcBef>
+              <a:buClr>
+                <a:schemeClr val="tx1">
+                  <a:lumMod val="65000"/>
+                  <a:lumOff val="35000"/>
+                </a:schemeClr>
+              </a:buClr>
+              <a:buFont typeface="+mj-lt"/>
+              <a:buAutoNum type="arabicPeriod"/>
+            </a:pPr>
+            <a:r>
+              <a:rPr lang="ko-KR" altLang="en-US" dirty="0"/>
+              <a:t>프로젝트 만들기</a:t>
+            </a:r>
+            <a:endParaRPr lang="en-US" altLang="ko-KR" dirty="0"/>
+          </a:p>
+          <a:p>
+            <a:pPr marL="609600" lvl="1" indent="-342900">
+              <a:buClr>
+                <a:schemeClr val="tx1">
+                  <a:lumMod val="50000"/>
+                  <a:lumOff val="50000"/>
+                </a:schemeClr>
+              </a:buClr>
+              <a:buFont typeface="+mj-lt"/>
+              <a:buAutoNum type="arabicPeriod"/>
+            </a:pPr>
+            <a:r>
+              <a:rPr lang="ko-KR" altLang="en-US" dirty="0"/>
+              <a:t>화면 </a:t>
+            </a:r>
+            <a:endParaRPr lang="en-US" altLang="ko-KR" dirty="0" smtClean="0"/>
+          </a:p>
+          <a:p>
+            <a:pPr marL="609600" lvl="1" indent="-342900">
+              <a:buClr>
+                <a:schemeClr val="tx1">
+                  <a:lumMod val="50000"/>
+                  <a:lumOff val="50000"/>
+                </a:schemeClr>
+              </a:buClr>
+              <a:buFont typeface="+mj-lt"/>
+              <a:buAutoNum type="arabicPeriod"/>
+            </a:pPr>
+            <a:r>
+              <a:rPr lang="ko-KR" altLang="en-US" dirty="0" smtClean="0">
+                <a:solidFill>
+                  <a:srgbClr val="0000FF"/>
+                </a:solidFill>
+              </a:rPr>
+              <a:t>프로젝트</a:t>
+            </a:r>
+            <a:r>
+              <a:rPr lang="ko-KR" altLang="en-US" dirty="0" smtClean="0"/>
+              <a:t> </a:t>
+            </a:r>
+            <a:r>
+              <a:rPr lang="ko-KR" altLang="en-US" dirty="0"/>
+              <a:t>이름 입력</a:t>
+            </a:r>
+            <a:r>
+              <a:rPr lang="en-US" altLang="ko-KR" dirty="0"/>
+              <a:t>: </a:t>
+            </a:r>
+            <a:endParaRPr lang="en-US" altLang="ko-KR" dirty="0" smtClean="0"/>
+          </a:p>
+          <a:p>
+            <a:endParaRPr lang="ko-KR" altLang="en-US" dirty="0"/>
+          </a:p>
+        </p:txBody>
+      </p:sp>
+    </p:spTree>
+    <p:extLst>
+      <p:ext uri="{BB962C8B-B14F-4D97-AF65-F5344CB8AC3E}">
+        <p14:creationId xmlns:p14="http://schemas.microsoft.com/office/powerpoint/2010/main" val="2239061091"/>
       </p:ext>
     </p:extLst>
   </p:cSld>

</xml_diff>